<commit_message>
This the New Updated file
</commit_message>
<xml_diff>
--- a/Cyber security.pptx
+++ b/Cyber security.pptx
@@ -24,6 +24,7 @@
     <p:sldId id="273" r:id="rId18"/>
     <p:sldId id="272" r:id="rId19"/>
     <p:sldId id="274" r:id="rId20"/>
+    <p:sldId id="275" r:id="rId21"/>
   </p:sldIdLst>
   <p:sldSz cx="12192000" cy="6858000"/>
   <p:notesSz cx="6858000" cy="9144000"/>
@@ -261,7 +262,7 @@
           <a:p>
             <a:fld id="{AC75D130-47DE-4A9A-9459-4578BE7EAE1C}" type="datetimeFigureOut">
               <a:rPr lang="en-IN" smtClean="0"/>
-              <a:t>19-05-2021</a:t>
+              <a:t>31-07-2021</a:t>
             </a:fld>
             <a:endParaRPr lang="en-IN"/>
           </a:p>
@@ -431,7 +432,7 @@
           <a:p>
             <a:fld id="{AC75D130-47DE-4A9A-9459-4578BE7EAE1C}" type="datetimeFigureOut">
               <a:rPr lang="en-IN" smtClean="0"/>
-              <a:t>19-05-2021</a:t>
+              <a:t>31-07-2021</a:t>
             </a:fld>
             <a:endParaRPr lang="en-IN"/>
           </a:p>
@@ -611,7 +612,7 @@
           <a:p>
             <a:fld id="{AC75D130-47DE-4A9A-9459-4578BE7EAE1C}" type="datetimeFigureOut">
               <a:rPr lang="en-IN" smtClean="0"/>
-              <a:t>19-05-2021</a:t>
+              <a:t>31-07-2021</a:t>
             </a:fld>
             <a:endParaRPr lang="en-IN"/>
           </a:p>
@@ -781,7 +782,7 @@
           <a:p>
             <a:fld id="{AC75D130-47DE-4A9A-9459-4578BE7EAE1C}" type="datetimeFigureOut">
               <a:rPr lang="en-IN" smtClean="0"/>
-              <a:t>19-05-2021</a:t>
+              <a:t>31-07-2021</a:t>
             </a:fld>
             <a:endParaRPr lang="en-IN"/>
           </a:p>
@@ -1027,7 +1028,7 @@
           <a:p>
             <a:fld id="{AC75D130-47DE-4A9A-9459-4578BE7EAE1C}" type="datetimeFigureOut">
               <a:rPr lang="en-IN" smtClean="0"/>
-              <a:t>19-05-2021</a:t>
+              <a:t>31-07-2021</a:t>
             </a:fld>
             <a:endParaRPr lang="en-IN"/>
           </a:p>
@@ -1259,7 +1260,7 @@
           <a:p>
             <a:fld id="{AC75D130-47DE-4A9A-9459-4578BE7EAE1C}" type="datetimeFigureOut">
               <a:rPr lang="en-IN" smtClean="0"/>
-              <a:t>19-05-2021</a:t>
+              <a:t>31-07-2021</a:t>
             </a:fld>
             <a:endParaRPr lang="en-IN"/>
           </a:p>
@@ -1626,7 +1627,7 @@
           <a:p>
             <a:fld id="{AC75D130-47DE-4A9A-9459-4578BE7EAE1C}" type="datetimeFigureOut">
               <a:rPr lang="en-IN" smtClean="0"/>
-              <a:t>19-05-2021</a:t>
+              <a:t>31-07-2021</a:t>
             </a:fld>
             <a:endParaRPr lang="en-IN"/>
           </a:p>
@@ -1744,7 +1745,7 @@
           <a:p>
             <a:fld id="{AC75D130-47DE-4A9A-9459-4578BE7EAE1C}" type="datetimeFigureOut">
               <a:rPr lang="en-IN" smtClean="0"/>
-              <a:t>19-05-2021</a:t>
+              <a:t>31-07-2021</a:t>
             </a:fld>
             <a:endParaRPr lang="en-IN"/>
           </a:p>
@@ -1839,7 +1840,7 @@
           <a:p>
             <a:fld id="{AC75D130-47DE-4A9A-9459-4578BE7EAE1C}" type="datetimeFigureOut">
               <a:rPr lang="en-IN" smtClean="0"/>
-              <a:t>19-05-2021</a:t>
+              <a:t>31-07-2021</a:t>
             </a:fld>
             <a:endParaRPr lang="en-IN"/>
           </a:p>
@@ -2116,7 +2117,7 @@
           <a:p>
             <a:fld id="{AC75D130-47DE-4A9A-9459-4578BE7EAE1C}" type="datetimeFigureOut">
               <a:rPr lang="en-IN" smtClean="0"/>
-              <a:t>19-05-2021</a:t>
+              <a:t>31-07-2021</a:t>
             </a:fld>
             <a:endParaRPr lang="en-IN"/>
           </a:p>
@@ -2369,7 +2370,7 @@
           <a:p>
             <a:fld id="{AC75D130-47DE-4A9A-9459-4578BE7EAE1C}" type="datetimeFigureOut">
               <a:rPr lang="en-IN" smtClean="0"/>
-              <a:t>19-05-2021</a:t>
+              <a:t>31-07-2021</a:t>
             </a:fld>
             <a:endParaRPr lang="en-IN"/>
           </a:p>
@@ -2582,7 +2583,7 @@
           <a:p>
             <a:fld id="{AC75D130-47DE-4A9A-9459-4578BE7EAE1C}" type="datetimeFigureOut">
               <a:rPr lang="en-IN" smtClean="0"/>
-              <a:t>19-05-2021</a:t>
+              <a:t>31-07-2021</a:t>
             </a:fld>
             <a:endParaRPr lang="en-IN"/>
           </a:p>
@@ -3916,6 +3917,78 @@
 </p:sld>
 </file>
 
+<file path=ppt/slides/slide20.xml><?xml version="1.0" encoding="utf-8"?>
+<p:sld xmlns:a="http://schemas.openxmlformats.org/drawingml/2006/main" xmlns:r="http://schemas.openxmlformats.org/officeDocument/2006/relationships" xmlns:p="http://schemas.openxmlformats.org/presentationml/2006/main">
+  <p:cSld>
+    <p:spTree>
+      <p:nvGrpSpPr>
+        <p:cNvPr id="1" name=""/>
+        <p:cNvGrpSpPr/>
+        <p:nvPr/>
+      </p:nvGrpSpPr>
+      <p:grpSpPr>
+        <a:xfrm>
+          <a:off x="0" y="0"/>
+          <a:ext cx="0" cy="0"/>
+          <a:chOff x="0" y="0"/>
+          <a:chExt cx="0" cy="0"/>
+        </a:xfrm>
+      </p:grpSpPr>
+      <p:sp>
+        <p:nvSpPr>
+          <p:cNvPr id="2" name="Title 1"/>
+          <p:cNvSpPr>
+            <a:spLocks noGrp="1"/>
+          </p:cNvSpPr>
+          <p:nvPr>
+            <p:ph type="ctrTitle"/>
+          </p:nvPr>
+        </p:nvSpPr>
+        <p:spPr/>
+        <p:txBody>
+          <a:bodyPr/>
+          <a:lstStyle/>
+          <a:p>
+            <a:r>
+              <a:rPr lang="en-US" smtClean="0"/>
+              <a:t>TEST SLIDE</a:t>
+            </a:r>
+            <a:endParaRPr lang="en-IN"/>
+          </a:p>
+        </p:txBody>
+      </p:sp>
+      <p:sp>
+        <p:nvSpPr>
+          <p:cNvPr id="3" name="Subtitle 2"/>
+          <p:cNvSpPr>
+            <a:spLocks noGrp="1"/>
+          </p:cNvSpPr>
+          <p:nvPr>
+            <p:ph type="subTitle" idx="1"/>
+          </p:nvPr>
+        </p:nvSpPr>
+        <p:spPr/>
+        <p:txBody>
+          <a:bodyPr/>
+          <a:lstStyle/>
+          <a:p>
+            <a:endParaRPr lang="en-IN"/>
+          </a:p>
+        </p:txBody>
+      </p:sp>
+    </p:spTree>
+    <p:extLst>
+      <p:ext uri="{BB962C8B-B14F-4D97-AF65-F5344CB8AC3E}">
+        <p14:creationId xmlns:p14="http://schemas.microsoft.com/office/powerpoint/2010/main" val="1062973504"/>
+      </p:ext>
+    </p:extLst>
+  </p:cSld>
+  <p:clrMapOvr>
+    <a:masterClrMapping/>
+  </p:clrMapOvr>
+</p:sld>
+</file>
+
 <file path=ppt/slides/slide3.xml><?xml version="1.0" encoding="utf-8"?>
 <p:sld xmlns:a="http://schemas.openxmlformats.org/drawingml/2006/main" xmlns:r="http://schemas.openxmlformats.org/officeDocument/2006/relationships" xmlns:p="http://schemas.openxmlformats.org/presentationml/2006/main">
   <p:cSld>

</xml_diff>